<commit_message>
graph added to poster
</commit_message>
<xml_diff>
--- a/IR_P_Poster.pptx
+++ b/IR_P_Poster.pptx
@@ -3353,7 +3353,7 @@
         </p:nvSpPr>
         <p:spPr>
           <a:xfrm>
-            <a:off x="11179627" y="13813074"/>
+            <a:off x="11179627" y="11044240"/>
             <a:ext cx="9971314" cy="4770537"/>
           </a:xfrm>
           <a:prstGeom prst="rect">
@@ -3414,7 +3414,7 @@
         </p:nvSpPr>
         <p:spPr>
           <a:xfrm>
-            <a:off x="11179628" y="19876117"/>
+            <a:off x="11179628" y="23457517"/>
             <a:ext cx="10232572" cy="4524315"/>
           </a:xfrm>
           <a:prstGeom prst="rect">
@@ -3474,7 +3474,7 @@
         </p:nvSpPr>
         <p:spPr>
           <a:xfrm>
-            <a:off x="11179628" y="25689327"/>
+            <a:off x="11179628" y="28901291"/>
             <a:ext cx="10232572" cy="3293209"/>
           </a:xfrm>
           <a:prstGeom prst="rect">
@@ -3535,7 +3535,7 @@
         <p:spPr>
           <a:xfrm>
             <a:off x="11179627" y="4200636"/>
-            <a:ext cx="9971314" cy="8710077"/>
+            <a:ext cx="9971314" cy="6247864"/>
           </a:xfrm>
           <a:prstGeom prst="rect">
             <a:avLst/>
@@ -3566,7 +3566,7 @@
             </a:pPr>
             <a:r>
               <a:rPr lang="en-US" sz="3200" dirty="0"/>
-              <a:t>Player’s performance is predicted by factors such as player’s current trend, past season’s performances, explicit and implicit factors. We train our model on 2016-17 data with above factors and test our model on 2017-18 ranking the players in each game-week according to category.</a:t>
+              <a:t>Player’s performance is predicted by factors such as player’s current trend, past season’s performances, explicit and implicit factors. We train our model on 2016-17 data with above factors and test our model on 2017-18 ranking the players in each game-week according to category further used for building specific team configurations.</a:t>
             </a:r>
           </a:p>
           <a:p>
@@ -3577,16 +3577,6 @@
             <a:r>
               <a:rPr lang="en-US" sz="3200" dirty="0"/>
               <a:t>Players are ranked by assigning scores with Regression methods, SVR, and Bayesian Ridge models. Pairwise comparison of players is done using Ranking-SVM.</a:t>
-            </a:r>
-          </a:p>
-          <a:p>
-            <a:pPr marL="457200" indent="-457200">
-              <a:buFont typeface="Arial" panose="020B0604020202020204" pitchFamily="34" charset="0"/>
-              <a:buChar char="•"/>
-            </a:pPr>
-            <a:r>
-              <a:rPr lang="en-US" sz="3200" dirty="0"/>
-              <a:t>Our model also recommends a team by formulating the problem as a linear optimization one. We put constraints such as user’s budget, number of players in each category and position configurations. The optimization function returns a list of players which is recommended to the users.</a:t>
             </a:r>
           </a:p>
         </p:txBody>
@@ -3634,6 +3624,42 @@
           </a:fontRef>
         </p:style>
       </p:cxnSp>
+      <p:pic>
+        <p:nvPicPr>
+          <p:cNvPr id="21" name="Picture 20">
+            <a:extLst>
+              <a:ext uri="{FF2B5EF4-FFF2-40B4-BE49-F238E27FC236}">
+                <a16:creationId xmlns:a16="http://schemas.microsoft.com/office/drawing/2014/main" id="{4095A5EB-C241-4184-AA10-8EE82A4372D0}"/>
+              </a:ext>
+            </a:extLst>
+          </p:cNvPr>
+          <p:cNvPicPr>
+            <a:picLocks noChangeAspect="1"/>
+          </p:cNvPicPr>
+          <p:nvPr/>
+        </p:nvPicPr>
+        <p:blipFill>
+          <a:blip r:embed="rId4">
+            <a:extLst>
+              <a:ext uri="{28A0092B-C50C-407E-A947-70E740481C1C}">
+                <a14:useLocalDpi xmlns:a14="http://schemas.microsoft.com/office/drawing/2010/main" val="0"/>
+              </a:ext>
+            </a:extLst>
+          </a:blip>
+          <a:stretch>
+            <a:fillRect/>
+          </a:stretch>
+        </p:blipFill>
+        <p:spPr>
+          <a:xfrm>
+            <a:off x="11192840" y="15921676"/>
+            <a:ext cx="10559887" cy="7039924"/>
+          </a:xfrm>
+          <a:prstGeom prst="rect">
+            <a:avLst/>
+          </a:prstGeom>
+        </p:spPr>
+      </p:pic>
     </p:spTree>
     <p:extLst>
       <p:ext uri="{BB962C8B-B14F-4D97-AF65-F5344CB8AC3E}">

</xml_diff>